<commit_message>
Add note about feedback option
</commit_message>
<xml_diff>
--- a/002 friendly german default presentation/default.pptx
+++ b/002 friendly german default presentation/default.pptx
@@ -2177,7 +2177,7 @@
           </a:ln>
           <a:extLst>
             <a:ext uri="{C572A759-6A51-4108-AA02-DFA0A04FC94B}">
-              <ma14:wrappingTextBoxFlag xmlns:ma14="http://schemas.microsoft.com/office/mac/drawingml/2011/main" xmlns="" val="1"/>
+              <ma14:wrappingTextBoxFlag xmlns="" xmlns:ma14="http://schemas.microsoft.com/office/mac/drawingml/2011/main" val="1"/>
             </a:ext>
           </a:extLst>
         </p:spPr>
@@ -2216,7 +2216,7 @@
           </a:ln>
           <a:extLst>
             <a:ext uri="{C572A759-6A51-4108-AA02-DFA0A04FC94B}">
-              <ma14:wrappingTextBoxFlag xmlns:ma14="http://schemas.microsoft.com/office/mac/drawingml/2011/main" xmlns="" val="1"/>
+              <ma14:wrappingTextBoxFlag xmlns="" xmlns:ma14="http://schemas.microsoft.com/office/mac/drawingml/2011/main" val="1"/>
             </a:ext>
           </a:extLst>
         </p:spPr>
@@ -3190,7 +3190,7 @@
           </a:ln>
           <a:extLst>
             <a:ext uri="{C572A759-6A51-4108-AA02-DFA0A04FC94B}">
-              <ma14:wrappingTextBoxFlag xmlns:ma14="http://schemas.microsoft.com/office/mac/drawingml/2011/main" xmlns="" val="1"/>
+              <ma14:wrappingTextBoxFlag xmlns="" xmlns:ma14="http://schemas.microsoft.com/office/mac/drawingml/2011/main" val="1"/>
             </a:ext>
           </a:extLst>
         </p:spPr>
@@ -3247,7 +3247,7 @@
           </a:ln>
           <a:extLst>
             <a:ext uri="{C572A759-6A51-4108-AA02-DFA0A04FC94B}">
-              <ma14:wrappingTextBoxFlag xmlns:ma14="http://schemas.microsoft.com/office/mac/drawingml/2011/main" xmlns="" val="1"/>
+              <ma14:wrappingTextBoxFlag xmlns="" xmlns:ma14="http://schemas.microsoft.com/office/mac/drawingml/2011/main" val="1"/>
             </a:ext>
           </a:extLst>
         </p:spPr>
@@ -3316,7 +3316,7 @@
             </a:ln>
             <a:extLst>
               <a:ext uri="{C572A759-6A51-4108-AA02-DFA0A04FC94B}">
-                <ma14:wrappingTextBoxFlag xmlns:ma14="http://schemas.microsoft.com/office/mac/drawingml/2011/main" xmlns="" val="1"/>
+                <ma14:wrappingTextBoxFlag xmlns="" xmlns:ma14="http://schemas.microsoft.com/office/mac/drawingml/2011/main" val="1"/>
               </a:ext>
             </a:extLst>
           </p:spPr>
@@ -3365,7 +3365,7 @@
             </a:ln>
             <a:extLst>
               <a:ext uri="{C572A759-6A51-4108-AA02-DFA0A04FC94B}">
-                <ma14:wrappingTextBoxFlag xmlns:ma14="http://schemas.microsoft.com/office/mac/drawingml/2011/main" xmlns="" val="1"/>
+                <ma14:wrappingTextBoxFlag xmlns="" xmlns:ma14="http://schemas.microsoft.com/office/mac/drawingml/2011/main" val="1"/>
               </a:ext>
             </a:extLst>
           </p:spPr>
@@ -3514,7 +3514,7 @@
             </a:ln>
             <a:extLst>
               <a:ext uri="{C572A759-6A51-4108-AA02-DFA0A04FC94B}">
-                <ma14:wrappingTextBoxFlag xmlns:ma14="http://schemas.microsoft.com/office/mac/drawingml/2011/main" xmlns="" val="1"/>
+                <ma14:wrappingTextBoxFlag xmlns="" xmlns:ma14="http://schemas.microsoft.com/office/mac/drawingml/2011/main" val="1"/>
               </a:ext>
             </a:extLst>
           </p:spPr>
@@ -3562,7 +3562,7 @@
             </a:ln>
             <a:extLst>
               <a:ext uri="{C572A759-6A51-4108-AA02-DFA0A04FC94B}">
-                <ma14:wrappingTextBoxFlag xmlns:ma14="http://schemas.microsoft.com/office/mac/drawingml/2011/main" xmlns="" val="1"/>
+                <ma14:wrappingTextBoxFlag xmlns="" xmlns:ma14="http://schemas.microsoft.com/office/mac/drawingml/2011/main" val="1"/>
               </a:ext>
             </a:extLst>
           </p:spPr>
@@ -3700,7 +3700,7 @@
             </a:ln>
             <a:extLst>
               <a:ext uri="{C572A759-6A51-4108-AA02-DFA0A04FC94B}">
-                <ma14:wrappingTextBoxFlag xmlns:ma14="http://schemas.microsoft.com/office/mac/drawingml/2011/main" xmlns="" val="1"/>
+                <ma14:wrappingTextBoxFlag xmlns="" xmlns:ma14="http://schemas.microsoft.com/office/mac/drawingml/2011/main" val="1"/>
               </a:ext>
             </a:extLst>
           </p:spPr>
@@ -3748,7 +3748,7 @@
             </a:ln>
             <a:extLst>
               <a:ext uri="{C572A759-6A51-4108-AA02-DFA0A04FC94B}">
-                <ma14:wrappingTextBoxFlag xmlns:ma14="http://schemas.microsoft.com/office/mac/drawingml/2011/main" xmlns="" val="1"/>
+                <ma14:wrappingTextBoxFlag xmlns="" xmlns:ma14="http://schemas.microsoft.com/office/mac/drawingml/2011/main" val="1"/>
               </a:ext>
             </a:extLst>
           </p:spPr>
@@ -3907,7 +3907,7 @@
             </a:ln>
             <a:extLst>
               <a:ext uri="{C572A759-6A51-4108-AA02-DFA0A04FC94B}">
-                <ma14:wrappingTextBoxFlag xmlns:ma14="http://schemas.microsoft.com/office/mac/drawingml/2011/main" xmlns="" val="1"/>
+                <ma14:wrappingTextBoxFlag xmlns="" xmlns:ma14="http://schemas.microsoft.com/office/mac/drawingml/2011/main" val="1"/>
               </a:ext>
             </a:extLst>
           </p:spPr>
@@ -3956,7 +3956,7 @@
             </a:ln>
             <a:extLst>
               <a:ext uri="{C572A759-6A51-4108-AA02-DFA0A04FC94B}">
-                <ma14:wrappingTextBoxFlag xmlns:ma14="http://schemas.microsoft.com/office/mac/drawingml/2011/main" xmlns="" val="1"/>
+                <ma14:wrappingTextBoxFlag xmlns="" xmlns:ma14="http://schemas.microsoft.com/office/mac/drawingml/2011/main" val="1"/>
               </a:ext>
             </a:extLst>
           </p:spPr>
@@ -4101,7 +4101,7 @@
             </a:ln>
             <a:extLst>
               <a:ext uri="{C572A759-6A51-4108-AA02-DFA0A04FC94B}">
-                <ma14:wrappingTextBoxFlag xmlns:ma14="http://schemas.microsoft.com/office/mac/drawingml/2011/main" xmlns="" val="1"/>
+                <ma14:wrappingTextBoxFlag xmlns="" xmlns:ma14="http://schemas.microsoft.com/office/mac/drawingml/2011/main" val="1"/>
               </a:ext>
             </a:extLst>
           </p:spPr>
@@ -4150,7 +4150,7 @@
             </a:ln>
             <a:extLst>
               <a:ext uri="{C572A759-6A51-4108-AA02-DFA0A04FC94B}">
-                <ma14:wrappingTextBoxFlag xmlns:ma14="http://schemas.microsoft.com/office/mac/drawingml/2011/main" xmlns="" val="1"/>
+                <ma14:wrappingTextBoxFlag xmlns="" xmlns:ma14="http://schemas.microsoft.com/office/mac/drawingml/2011/main" val="1"/>
               </a:ext>
             </a:extLst>
           </p:spPr>
@@ -4889,7 +4889,7 @@
               </a:ln>
               <a:extLst>
                 <a:ext uri="{C572A759-6A51-4108-AA02-DFA0A04FC94B}">
-                  <ma14:wrappingTextBoxFlag xmlns:ma14="http://schemas.microsoft.com/office/mac/drawingml/2011/main" xmlns="" val="1"/>
+                  <ma14:wrappingTextBoxFlag xmlns="" xmlns:ma14="http://schemas.microsoft.com/office/mac/drawingml/2011/main" val="1"/>
                 </a:ext>
               </a:extLst>
             </p:spPr>
@@ -4944,7 +4944,7 @@
               </a:ln>
               <a:extLst>
                 <a:ext uri="{C572A759-6A51-4108-AA02-DFA0A04FC94B}">
-                  <ma14:wrappingTextBoxFlag xmlns:ma14="http://schemas.microsoft.com/office/mac/drawingml/2011/main" xmlns="" val="1"/>
+                  <ma14:wrappingTextBoxFlag xmlns="" xmlns:ma14="http://schemas.microsoft.com/office/mac/drawingml/2011/main" val="1"/>
                 </a:ext>
               </a:extLst>
             </p:spPr>
@@ -5115,6 +5115,229 @@
         <p:spPr>
           <a:xfrm rot="14216100" flipH="1">
             <a:off x="7357518" y="12328900"/>
+            <a:ext cx="1566096" cy="798709"/>
+          </a:xfrm>
+          <a:prstGeom prst="rect">
+            <a:avLst/>
+          </a:prstGeom>
+        </p:spPr>
+      </p:pic>
+      <p:grpSp>
+        <p:nvGrpSpPr>
+          <p:cNvPr id="45" name="Gruppieren 44">
+            <a:extLst>
+              <a:ext uri="{FF2B5EF4-FFF2-40B4-BE49-F238E27FC236}">
+                <a16:creationId xmlns:a16="http://schemas.microsoft.com/office/drawing/2014/main" id="{123F6FA9-ECA4-480B-881B-8E6B6382F66F}"/>
+              </a:ext>
+            </a:extLst>
+          </p:cNvPr>
+          <p:cNvGrpSpPr/>
+          <p:nvPr/>
+        </p:nvGrpSpPr>
+        <p:grpSpPr>
+          <a:xfrm>
+            <a:off x="19502993" y="1216547"/>
+            <a:ext cx="4664352" cy="1739901"/>
+            <a:chOff x="2205020" y="6546899"/>
+            <a:chExt cx="4664352" cy="1739901"/>
+          </a:xfrm>
+        </p:grpSpPr>
+        <p:sp>
+          <p:nvSpPr>
+            <p:cNvPr id="46" name="Instant messaging"/>
+            <p:cNvSpPr txBox="1"/>
+            <p:nvPr/>
+          </p:nvSpPr>
+          <p:spPr>
+            <a:xfrm>
+              <a:off x="3549164" y="6546899"/>
+              <a:ext cx="3320208" cy="304801"/>
+            </a:xfrm>
+            <a:prstGeom prst="rect">
+              <a:avLst/>
+            </a:prstGeom>
+            <a:ln w="12700">
+              <a:miter lim="400000"/>
+            </a:ln>
+            <a:extLst>
+              <a:ext uri="{C572A759-6A51-4108-AA02-DFA0A04FC94B}">
+                <ma14:wrappingTextBoxFlag xmlns="" xmlns:ma14="http://schemas.microsoft.com/office/mac/drawingml/2011/main" val="1"/>
+              </a:ext>
+            </a:extLst>
+          </p:spPr>
+          <p:txBody>
+            <a:bodyPr lIns="0" tIns="0" rIns="0" bIns="0">
+              <a:spAutoFit/>
+            </a:bodyPr>
+            <a:lstStyle>
+              <a:lvl1pPr algn="l">
+                <a:defRPr sz="2000" cap="all" spc="100">
+                  <a:solidFill>
+                    <a:srgbClr val="24262C"/>
+                  </a:solidFill>
+                  <a:latin typeface="Helvetica"/>
+                  <a:ea typeface="Helvetica"/>
+                  <a:cs typeface="Helvetica"/>
+                  <a:sym typeface="Helvetica"/>
+                </a:defRPr>
+              </a:lvl1pPr>
+            </a:lstStyle>
+            <a:p>
+              <a:r>
+                <a:rPr lang="en-US" dirty="0" smtClean="0"/>
+                <a:t>Feedback</a:t>
+              </a:r>
+              <a:endParaRPr dirty="0"/>
+            </a:p>
+          </p:txBody>
+        </p:sp>
+        <p:sp>
+          <p:nvSpPr>
+            <p:cNvPr id="47" name="Send public and private messages."/>
+            <p:cNvSpPr txBox="1"/>
+            <p:nvPr/>
+          </p:nvSpPr>
+          <p:spPr>
+            <a:xfrm>
+              <a:off x="3549164" y="7016799"/>
+              <a:ext cx="3320208" cy="1270001"/>
+            </a:xfrm>
+            <a:prstGeom prst="rect">
+              <a:avLst/>
+            </a:prstGeom>
+            <a:ln w="12700">
+              <a:miter lim="400000"/>
+            </a:ln>
+            <a:extLst>
+              <a:ext uri="{C572A759-6A51-4108-AA02-DFA0A04FC94B}">
+                <ma14:wrappingTextBoxFlag xmlns="" xmlns:ma14="http://schemas.microsoft.com/office/mac/drawingml/2011/main" val="1"/>
+              </a:ext>
+            </a:extLst>
+          </p:spPr>
+          <p:txBody>
+            <a:bodyPr lIns="0" tIns="0" rIns="0" bIns="0"/>
+            <a:lstStyle>
+              <a:lvl1pPr algn="l">
+                <a:lnSpc>
+                  <a:spcPct val="120000"/>
+                </a:lnSpc>
+                <a:defRPr sz="2200" b="0" spc="66">
+                  <a:solidFill>
+                    <a:srgbClr val="504E4E"/>
+                  </a:solidFill>
+                  <a:latin typeface="Helvetica"/>
+                  <a:ea typeface="Helvetica"/>
+                  <a:cs typeface="Helvetica"/>
+                  <a:sym typeface="Helvetica"/>
+                </a:defRPr>
+              </a:lvl1pPr>
+            </a:lstStyle>
+            <a:p>
+              <a:r>
+                <a:rPr lang="de-DE" dirty="0" smtClean="0"/>
+                <a:t>Beende die Konferenz über „Ausloggen“ um Feedback zu geben.</a:t>
+              </a:r>
+              <a:endParaRPr dirty="0"/>
+            </a:p>
+          </p:txBody>
+        </p:sp>
+        <p:sp>
+          <p:nvSpPr>
+            <p:cNvPr id="48" name="Circle"/>
+            <p:cNvSpPr/>
+            <p:nvPr/>
+          </p:nvSpPr>
+          <p:spPr>
+            <a:xfrm>
+              <a:off x="2205020" y="6573630"/>
+              <a:ext cx="1016001" cy="1016001"/>
+            </a:xfrm>
+            <a:prstGeom prst="ellipse">
+              <a:avLst/>
+            </a:prstGeom>
+            <a:solidFill>
+              <a:srgbClr val="0E70D7"/>
+            </a:solidFill>
+            <a:ln w="12700">
+              <a:miter lim="400000"/>
+            </a:ln>
+          </p:spPr>
+          <p:txBody>
+            <a:bodyPr lIns="38100" tIns="38100" rIns="38100" bIns="38100" anchor="ctr"/>
+            <a:lstStyle/>
+            <a:p>
+              <a:pPr algn="l">
+                <a:defRPr spc="-90">
+                  <a:solidFill>
+                    <a:srgbClr val="0E70D7"/>
+                  </a:solidFill>
+                  <a:latin typeface="Helvetica"/>
+                  <a:ea typeface="Helvetica"/>
+                  <a:cs typeface="Helvetica"/>
+                  <a:sym typeface="Helvetica"/>
+                </a:defRPr>
+              </a:pPr>
+              <a:endParaRPr/>
+            </a:p>
+          </p:txBody>
+        </p:sp>
+        <p:pic>
+          <p:nvPicPr>
+            <p:cNvPr id="49" name="Image" descr="Image"/>
+            <p:cNvPicPr>
+              <a:picLocks noChangeAspect="1"/>
+            </p:cNvPicPr>
+            <p:nvPr/>
+          </p:nvPicPr>
+          <p:blipFill>
+            <a:blip r:embed="rId2"/>
+            <a:stretch>
+              <a:fillRect/>
+            </a:stretch>
+          </p:blipFill>
+          <p:spPr>
+            <a:xfrm>
+              <a:off x="2484202" y="6853030"/>
+              <a:ext cx="457637" cy="457201"/>
+            </a:xfrm>
+            <a:prstGeom prst="rect">
+              <a:avLst/>
+            </a:prstGeom>
+            <a:ln w="12700">
+              <a:miter lim="400000"/>
+            </a:ln>
+          </p:spPr>
+        </p:pic>
+      </p:grpSp>
+      <p:pic>
+        <p:nvPicPr>
+          <p:cNvPr id="50" name="Grafik 49">
+            <a:extLst>
+              <a:ext uri="{FF2B5EF4-FFF2-40B4-BE49-F238E27FC236}">
+                <a16:creationId xmlns:a16="http://schemas.microsoft.com/office/drawing/2014/main" id="{CDE06871-B1F5-47FB-8941-F28132AAEAF3}"/>
+              </a:ext>
+            </a:extLst>
+          </p:cNvPr>
+          <p:cNvPicPr>
+            <a:picLocks noChangeAspect="1"/>
+          </p:cNvPicPr>
+          <p:nvPr/>
+        </p:nvPicPr>
+        <p:blipFill>
+          <a:blip r:embed="rId14" cstate="print">
+            <a:extLst>
+              <a:ext uri="{28A0092B-C50C-407E-A947-70E740481C1C}">
+                <a14:useLocalDpi xmlns:a14="http://schemas.microsoft.com/office/drawing/2010/main" val="0"/>
+              </a:ext>
+            </a:extLst>
+          </a:blip>
+          <a:stretch>
+            <a:fillRect/>
+          </a:stretch>
+        </p:blipFill>
+        <p:spPr>
+          <a:xfrm rot="7101313" flipH="1">
+            <a:off x="22576925" y="481193"/>
             <a:ext cx="1566096" cy="798709"/>
           </a:xfrm>
           <a:prstGeom prst="rect">

</xml_diff>